<commit_message>
Fix Arduino bill of materials
</commit_message>
<xml_diff>
--- a/Week 4/Week 4.pptx
+++ b/Week 4/Week 4.pptx
@@ -146,7 +146,7 @@
   </p:defaultTextStyle>
   <p:extLst>
     <p:ext uri="{EFAFB233-063F-42B5-8137-9DF3F51BA10A}">
-      <p15:sldGuideLst xmlns:p15="http://schemas.microsoft.com/office/powerpoint/2012/main" xmlns="">
+      <p15:sldGuideLst xmlns="" xmlns:p15="http://schemas.microsoft.com/office/powerpoint/2012/main">
         <p15:guide id="1" orient="horz" pos="2160">
           <p15:clr>
             <a:srgbClr val="A4A3A4"/>
@@ -245,7 +245,7 @@
           <a:p>
             <a:fld id="{90AF4669-11A5-AA4B-ACB6-1CD3E71EA0D2}" type="datetimeFigureOut">
               <a:rPr lang="en-US" smtClean="0"/>
-              <a:t>1/29/15</a:t>
+              <a:t>1/30/15</a:t>
             </a:fld>
             <a:endParaRPr lang="en-US"/>
           </a:p>
@@ -803,7 +803,7 @@
           <a:p>
             <a:fld id="{C95D1B94-35C6-4950-B226-D68A01DA1DCF}" type="datetimeFigureOut">
               <a:rPr lang="en-US" smtClean="0"/>
-              <a:t>1/29/15</a:t>
+              <a:t>1/30/15</a:t>
             </a:fld>
             <a:endParaRPr lang="en-US"/>
           </a:p>
@@ -968,7 +968,7 @@
           <a:p>
             <a:fld id="{C95D1B94-35C6-4950-B226-D68A01DA1DCF}" type="datetimeFigureOut">
               <a:rPr lang="en-US" smtClean="0"/>
-              <a:t>1/29/15</a:t>
+              <a:t>1/30/15</a:t>
             </a:fld>
             <a:endParaRPr lang="en-US"/>
           </a:p>
@@ -1143,7 +1143,7 @@
           <a:p>
             <a:fld id="{C95D1B94-35C6-4950-B226-D68A01DA1DCF}" type="datetimeFigureOut">
               <a:rPr lang="en-US" smtClean="0"/>
-              <a:t>1/29/15</a:t>
+              <a:t>1/30/15</a:t>
             </a:fld>
             <a:endParaRPr lang="en-US"/>
           </a:p>
@@ -1326,7 +1326,7 @@
           <a:p>
             <a:fld id="{C95D1B94-35C6-4950-B226-D68A01DA1DCF}" type="datetimeFigureOut">
               <a:rPr lang="en-US" smtClean="0"/>
-              <a:t>1/29/15</a:t>
+              <a:t>1/30/15</a:t>
             </a:fld>
             <a:endParaRPr lang="en-US"/>
           </a:p>
@@ -1588,7 +1588,7 @@
           <a:p>
             <a:fld id="{C95D1B94-35C6-4950-B226-D68A01DA1DCF}" type="datetimeFigureOut">
               <a:rPr lang="en-US" smtClean="0"/>
-              <a:t>1/29/15</a:t>
+              <a:t>1/30/15</a:t>
             </a:fld>
             <a:endParaRPr lang="en-US"/>
           </a:p>
@@ -1936,7 +1936,7 @@
           <a:p>
             <a:fld id="{C95D1B94-35C6-4950-B226-D68A01DA1DCF}" type="datetimeFigureOut">
               <a:rPr lang="en-US" smtClean="0"/>
-              <a:t>1/29/15</a:t>
+              <a:t>1/30/15</a:t>
             </a:fld>
             <a:endParaRPr lang="en-US"/>
           </a:p>
@@ -2244,7 +2244,7 @@
           <a:p>
             <a:fld id="{C95D1B94-35C6-4950-B226-D68A01DA1DCF}" type="datetimeFigureOut">
               <a:rPr lang="en-US" smtClean="0"/>
-              <a:t>1/29/15</a:t>
+              <a:t>1/30/15</a:t>
             </a:fld>
             <a:endParaRPr lang="en-US"/>
           </a:p>
@@ -2471,7 +2471,7 @@
           <a:p>
             <a:fld id="{C95D1B94-35C6-4950-B226-D68A01DA1DCF}" type="datetimeFigureOut">
               <a:rPr lang="en-US" smtClean="0"/>
-              <a:t>1/29/15</a:t>
+              <a:t>1/30/15</a:t>
             </a:fld>
             <a:endParaRPr lang="en-US"/>
           </a:p>
@@ -2561,7 +2561,7 @@
           <a:p>
             <a:fld id="{C95D1B94-35C6-4950-B226-D68A01DA1DCF}" type="datetimeFigureOut">
               <a:rPr lang="en-US" smtClean="0"/>
-              <a:t>1/29/15</a:t>
+              <a:t>1/30/15</a:t>
             </a:fld>
             <a:endParaRPr lang="en-US"/>
           </a:p>
@@ -2849,7 +2849,7 @@
           <a:p>
             <a:fld id="{C95D1B94-35C6-4950-B226-D68A01DA1DCF}" type="datetimeFigureOut">
               <a:rPr lang="en-US" smtClean="0"/>
-              <a:t>1/29/15</a:t>
+              <a:t>1/30/15</a:t>
             </a:fld>
             <a:endParaRPr lang="en-US"/>
           </a:p>
@@ -3118,7 +3118,7 @@
           <a:p>
             <a:fld id="{C95D1B94-35C6-4950-B226-D68A01DA1DCF}" type="datetimeFigureOut">
               <a:rPr lang="en-US" smtClean="0"/>
-              <a:t>1/29/15</a:t>
+              <a:t>1/30/15</a:t>
             </a:fld>
             <a:endParaRPr lang="en-US"/>
           </a:p>
@@ -3328,7 +3328,7 @@
           <a:p>
             <a:fld id="{C95D1B94-35C6-4950-B226-D68A01DA1DCF}" type="datetimeFigureOut">
               <a:rPr lang="en-US" smtClean="0"/>
-              <a:t>1/29/15</a:t>
+              <a:t>1/30/15</a:t>
             </a:fld>
             <a:endParaRPr lang="en-US"/>
           </a:p>
@@ -10330,7 +10330,15 @@
             <a:pPr lvl="1"/>
             <a:r>
               <a:rPr lang="en-US" dirty="0" smtClean="0"/>
-              <a:t>Should total no more than $60 dollars overall (pre-tax)</a:t>
+              <a:t>Should total no more than </a:t>
+            </a:r>
+            <a:r>
+              <a:rPr lang="en-US" dirty="0" smtClean="0"/>
+              <a:t>$40 </a:t>
+            </a:r>
+            <a:r>
+              <a:rPr lang="en-US" dirty="0" smtClean="0"/>
+              <a:t>dollars overall (pre-tax)</a:t>
             </a:r>
             <a:endParaRPr lang="en-US" dirty="0"/>
           </a:p>
@@ -11779,23 +11787,11 @@
           <a:p>
             <a:r>
               <a:rPr lang="en-US" dirty="0" smtClean="0"/>
-              <a:t>USB to TTL converter (</a:t>
-            </a:r>
-            <a:r>
-              <a:rPr lang="en-US" dirty="0" smtClean="0">
-                <a:hlinkClick r:id="rId4"/>
-              </a:rPr>
-              <a:t>$20 on Amazon</a:t>
-            </a:r>
-            <a:r>
-              <a:rPr lang="en-US" dirty="0" smtClean="0"/>
-              <a:t>)</a:t>
-            </a:r>
-          </a:p>
-          <a:p>
-            <a:r>
-              <a:rPr lang="en-US" dirty="0" smtClean="0"/>
-              <a:t>Battery with female JST connector (</a:t>
+              <a:t>Battery </a:t>
+            </a:r>
+            <a:r>
+              <a:rPr lang="en-US" dirty="0" smtClean="0"/>
+              <a:t>with female JST connector (</a:t>
             </a:r>
             <a:r>
               <a:rPr lang="en-US" dirty="0" smtClean="0">
@@ -11839,14 +11835,11 @@
             <a:pPr lvl="1"/>
             <a:r>
               <a:rPr lang="en-US" dirty="0" smtClean="0"/>
-              <a:t>You could conceivably get cheaper parts, esp. in the USB -&gt; TTL dept.</a:t>
-            </a:r>
-          </a:p>
-          <a:p>
-            <a:pPr lvl="1"/>
-            <a:r>
-              <a:rPr lang="en-US" dirty="0" smtClean="0"/>
-              <a:t>These are the ones I know work, using other parts YMMV</a:t>
+              <a:t>These </a:t>
+            </a:r>
+            <a:r>
+              <a:rPr lang="en-US" dirty="0" smtClean="0"/>
+              <a:t>are the ones I know work, using other parts YMMV</a:t>
             </a:r>
           </a:p>
         </p:txBody>

</xml_diff>